<commit_message>
update file directories, prepare presentation of EDA
</commit_message>
<xml_diff>
--- a/media/research_updates_2020-12-02.pptx
+++ b/media/research_updates_2020-12-02.pptx
@@ -10,6 +10,9 @@
     <p:sldId id="258" r:id="rId4"/>
     <p:sldId id="259" r:id="rId5"/>
     <p:sldId id="260" r:id="rId6"/>
+    <p:sldId id="261" r:id="rId7"/>
+    <p:sldId id="262" r:id="rId8"/>
+    <p:sldId id="263" r:id="rId9"/>
   </p:sldIdLst>
   <p:sldSz cx="12192000" cy="6858000"/>
   <p:notesSz cx="6858000" cy="9144000"/>
@@ -12601,7 +12604,23 @@
           <a:bodyPr/>
           <a:lstStyle/>
           <a:p>
-            <a:endParaRPr lang="en-US"/>
+            <a:r>
+              <a:rPr lang="en-US" dirty="0"/>
+              <a:t>Use multimodal approach</a:t>
+            </a:r>
+          </a:p>
+          <a:p>
+            <a:r>
+              <a:rPr lang="en-US" dirty="0"/>
+              <a:t>Different ways to frame the question:</a:t>
+            </a:r>
+          </a:p>
+          <a:p>
+            <a:pPr lvl="1"/>
+            <a:r>
+              <a:rPr lang="en-US" dirty="0"/>
+              <a:t>What is the fewest number of tweets we need in order to classify a person’s tweets as depressed or not?</a:t>
+            </a:r>
           </a:p>
         </p:txBody>
       </p:sp>
@@ -12684,7 +12703,38 @@
           <a:bodyPr/>
           <a:lstStyle/>
           <a:p>
-            <a:endParaRPr lang="en-US" dirty="0"/>
+            <a:r>
+              <a:rPr lang="en-US" dirty="0"/>
+              <a:t>Use multimodal approach:</a:t>
+            </a:r>
+          </a:p>
+          <a:p>
+            <a:pPr lvl="1"/>
+            <a:r>
+              <a:rPr lang="en-US" dirty="0"/>
+              <a:t>Tweet text</a:t>
+            </a:r>
+          </a:p>
+          <a:p>
+            <a:pPr lvl="1"/>
+            <a:r>
+              <a:rPr lang="en-US" dirty="0"/>
+              <a:t>User information / Twitter behavior</a:t>
+            </a:r>
+          </a:p>
+          <a:p>
+            <a:pPr lvl="1"/>
+            <a:r>
+              <a:rPr lang="en-US" dirty="0"/>
+              <a:t>Demographics / location</a:t>
+            </a:r>
+          </a:p>
+          <a:p>
+            <a:pPr lvl="1"/>
+            <a:r>
+              <a:rPr lang="en-US" dirty="0"/>
+              <a:t>Topic assignment of tweet (from LDA, topic models)</a:t>
+            </a:r>
           </a:p>
           <a:p>
             <a:r>
@@ -12785,11 +12835,11 @@
               <a:t>2020-11-25: Scraped 25,000 COVID tweets (keywords: </a:t>
             </a:r>
             <a:r>
-              <a:rPr lang="en-US" err="1"/>
+              <a:rPr lang="en-US" dirty="0" err="1"/>
               <a:t>covid</a:t>
             </a:r>
             <a:r>
-              <a:rPr lang="en-US"/>
+              <a:rPr lang="en-US" dirty="0"/>
               <a:t>, </a:t>
             </a:r>
           </a:p>
@@ -12799,6 +12849,363 @@
     <p:extLst>
       <p:ext uri="{BB962C8B-B14F-4D97-AF65-F5344CB8AC3E}">
         <p14:creationId xmlns:p14="http://schemas.microsoft.com/office/powerpoint/2010/main" val="1775000133"/>
+      </p:ext>
+    </p:extLst>
+  </p:cSld>
+  <p:clrMapOvr>
+    <a:masterClrMapping/>
+  </p:clrMapOvr>
+</p:sld>
+</file>
+
+<file path=ppt/slides/slide6.xml><?xml version="1.0" encoding="utf-8"?>
+<p:sld xmlns:a="http://schemas.openxmlformats.org/drawingml/2006/main" xmlns:r="http://schemas.openxmlformats.org/officeDocument/2006/relationships" xmlns:p="http://schemas.openxmlformats.org/presentationml/2006/main">
+  <p:cSld>
+    <p:spTree>
+      <p:nvGrpSpPr>
+        <p:cNvPr id="1" name=""/>
+        <p:cNvGrpSpPr/>
+        <p:nvPr/>
+      </p:nvGrpSpPr>
+      <p:grpSpPr>
+        <a:xfrm>
+          <a:off x="0" y="0"/>
+          <a:ext cx="0" cy="0"/>
+          <a:chOff x="0" y="0"/>
+          <a:chExt cx="0" cy="0"/>
+        </a:xfrm>
+      </p:grpSpPr>
+      <p:sp>
+        <p:nvSpPr>
+          <p:cNvPr id="2" name="Title 1">
+            <a:extLst>
+              <a:ext uri="{FF2B5EF4-FFF2-40B4-BE49-F238E27FC236}">
+                <a16:creationId xmlns:a16="http://schemas.microsoft.com/office/drawing/2014/main" id="{76265D0B-EFD2-AF40-944D-62DE89A04E2A}"/>
+              </a:ext>
+            </a:extLst>
+          </p:cNvPr>
+          <p:cNvSpPr>
+            <a:spLocks noGrp="1"/>
+          </p:cNvSpPr>
+          <p:nvPr>
+            <p:ph type="title"/>
+          </p:nvPr>
+        </p:nvSpPr>
+        <p:spPr/>
+        <p:txBody>
+          <a:bodyPr/>
+          <a:lstStyle/>
+          <a:p>
+            <a:r>
+              <a:rPr lang="en-US" dirty="0"/>
+              <a:t>Exploratory data analysis</a:t>
+            </a:r>
+          </a:p>
+        </p:txBody>
+      </p:sp>
+      <p:sp>
+        <p:nvSpPr>
+          <p:cNvPr id="7" name="Content Placeholder 6">
+            <a:extLst>
+              <a:ext uri="{FF2B5EF4-FFF2-40B4-BE49-F238E27FC236}">
+                <a16:creationId xmlns:a16="http://schemas.microsoft.com/office/drawing/2014/main" id="{9B096DC1-CE5C-8743-BD19-84821FF00886}"/>
+              </a:ext>
+            </a:extLst>
+          </p:cNvPr>
+          <p:cNvSpPr>
+            <a:spLocks noGrp="1"/>
+          </p:cNvSpPr>
+          <p:nvPr>
+            <p:ph idx="1"/>
+          </p:nvPr>
+        </p:nvSpPr>
+        <p:spPr/>
+        <p:txBody>
+          <a:bodyPr/>
+          <a:lstStyle/>
+          <a:p>
+            <a:endParaRPr lang="en-US"/>
+          </a:p>
+        </p:txBody>
+      </p:sp>
+    </p:spTree>
+    <p:extLst>
+      <p:ext uri="{BB962C8B-B14F-4D97-AF65-F5344CB8AC3E}">
+        <p14:creationId xmlns:p14="http://schemas.microsoft.com/office/powerpoint/2010/main" val="2627865955"/>
+      </p:ext>
+    </p:extLst>
+  </p:cSld>
+  <p:clrMapOvr>
+    <a:masterClrMapping/>
+  </p:clrMapOvr>
+</p:sld>
+</file>
+
+<file path=ppt/slides/slide7.xml><?xml version="1.0" encoding="utf-8"?>
+<p:sld xmlns:a="http://schemas.openxmlformats.org/drawingml/2006/main" xmlns:r="http://schemas.openxmlformats.org/officeDocument/2006/relationships" xmlns:p="http://schemas.openxmlformats.org/presentationml/2006/main">
+  <p:cSld>
+    <p:spTree>
+      <p:nvGrpSpPr>
+        <p:cNvPr id="1" name=""/>
+        <p:cNvGrpSpPr/>
+        <p:nvPr/>
+      </p:nvGrpSpPr>
+      <p:grpSpPr>
+        <a:xfrm>
+          <a:off x="0" y="0"/>
+          <a:ext cx="0" cy="0"/>
+          <a:chOff x="0" y="0"/>
+          <a:chExt cx="0" cy="0"/>
+        </a:xfrm>
+      </p:grpSpPr>
+      <p:pic>
+        <p:nvPicPr>
+          <p:cNvPr id="7" name="Picture 6">
+            <a:extLst>
+              <a:ext uri="{FF2B5EF4-FFF2-40B4-BE49-F238E27FC236}">
+                <a16:creationId xmlns:a16="http://schemas.microsoft.com/office/drawing/2014/main" id="{588D1E7F-882C-BA46-90B3-E63041F1D8C9}"/>
+              </a:ext>
+            </a:extLst>
+          </p:cNvPr>
+          <p:cNvPicPr>
+            <a:picLocks noChangeAspect="1"/>
+          </p:cNvPicPr>
+          <p:nvPr/>
+        </p:nvPicPr>
+        <p:blipFill>
+          <a:blip r:embed="rId2"/>
+          <a:stretch>
+            <a:fillRect/>
+          </a:stretch>
+        </p:blipFill>
+        <p:spPr>
+          <a:xfrm>
+            <a:off x="601060" y="1576552"/>
+            <a:ext cx="4854465" cy="3883572"/>
+          </a:xfrm>
+          <a:prstGeom prst="rect">
+            <a:avLst/>
+          </a:prstGeom>
+        </p:spPr>
+      </p:pic>
+      <p:pic>
+        <p:nvPicPr>
+          <p:cNvPr id="9" name="Picture 8">
+            <a:extLst>
+              <a:ext uri="{FF2B5EF4-FFF2-40B4-BE49-F238E27FC236}">
+                <a16:creationId xmlns:a16="http://schemas.microsoft.com/office/drawing/2014/main" id="{8F294445-DBEB-AD4F-9209-F526E09E5F18}"/>
+              </a:ext>
+            </a:extLst>
+          </p:cNvPr>
+          <p:cNvPicPr>
+            <a:picLocks noChangeAspect="1"/>
+          </p:cNvPicPr>
+          <p:nvPr/>
+        </p:nvPicPr>
+        <p:blipFill>
+          <a:blip r:embed="rId3"/>
+          <a:stretch>
+            <a:fillRect/>
+          </a:stretch>
+        </p:blipFill>
+        <p:spPr>
+          <a:xfrm>
+            <a:off x="6308177" y="1576552"/>
+            <a:ext cx="4854465" cy="3883572"/>
+          </a:xfrm>
+          <a:prstGeom prst="rect">
+            <a:avLst/>
+          </a:prstGeom>
+        </p:spPr>
+      </p:pic>
+      <p:sp>
+        <p:nvSpPr>
+          <p:cNvPr id="10" name="Title 9">
+            <a:extLst>
+              <a:ext uri="{FF2B5EF4-FFF2-40B4-BE49-F238E27FC236}">
+                <a16:creationId xmlns:a16="http://schemas.microsoft.com/office/drawing/2014/main" id="{0801F5D1-3869-CA43-A459-A5A7E6E57895}"/>
+              </a:ext>
+            </a:extLst>
+          </p:cNvPr>
+          <p:cNvSpPr>
+            <a:spLocks noGrp="1"/>
+          </p:cNvSpPr>
+          <p:nvPr>
+            <p:ph type="title"/>
+          </p:nvPr>
+        </p:nvSpPr>
+        <p:spPr>
+          <a:xfrm>
+            <a:off x="1143001" y="97982"/>
+            <a:ext cx="9905998" cy="1478570"/>
+          </a:xfrm>
+        </p:spPr>
+        <p:txBody>
+          <a:bodyPr/>
+          <a:lstStyle/>
+          <a:p>
+            <a:r>
+              <a:rPr lang="en-US" dirty="0" err="1"/>
+              <a:t>Wordclouds</a:t>
+            </a:r>
+            <a:endParaRPr lang="en-US" dirty="0"/>
+          </a:p>
+        </p:txBody>
+      </p:sp>
+      <p:sp>
+        <p:nvSpPr>
+          <p:cNvPr id="12" name="TextBox 11">
+            <a:extLst>
+              <a:ext uri="{FF2B5EF4-FFF2-40B4-BE49-F238E27FC236}">
+                <a16:creationId xmlns:a16="http://schemas.microsoft.com/office/drawing/2014/main" id="{4BA577F5-4ED0-EA4D-8E8F-EFCB24A5E5E2}"/>
+              </a:ext>
+            </a:extLst>
+          </p:cNvPr>
+          <p:cNvSpPr txBox="1"/>
+          <p:nvPr/>
+        </p:nvSpPr>
+        <p:spPr>
+          <a:xfrm>
+            <a:off x="1207537" y="5675586"/>
+            <a:ext cx="3641510" cy="369332"/>
+          </a:xfrm>
+          <a:prstGeom prst="rect">
+            <a:avLst/>
+          </a:prstGeom>
+          <a:noFill/>
+        </p:spPr>
+        <p:txBody>
+          <a:bodyPr wrap="none" rtlCol="0">
+            <a:spAutoFit/>
+          </a:bodyPr>
+          <a:lstStyle/>
+          <a:p>
+            <a:r>
+              <a:rPr lang="en-US" dirty="0"/>
+              <a:t>COVID tweets, November 25th, 2020</a:t>
+            </a:r>
+          </a:p>
+        </p:txBody>
+      </p:sp>
+      <p:sp>
+        <p:nvSpPr>
+          <p:cNvPr id="13" name="TextBox 12">
+            <a:extLst>
+              <a:ext uri="{FF2B5EF4-FFF2-40B4-BE49-F238E27FC236}">
+                <a16:creationId xmlns:a16="http://schemas.microsoft.com/office/drawing/2014/main" id="{E3182CA7-D543-0845-B4DB-4F27B5FB853A}"/>
+              </a:ext>
+            </a:extLst>
+          </p:cNvPr>
+          <p:cNvSpPr txBox="1"/>
+          <p:nvPr/>
+        </p:nvSpPr>
+        <p:spPr>
+          <a:xfrm>
+            <a:off x="6607775" y="5675586"/>
+            <a:ext cx="4255267" cy="369332"/>
+          </a:xfrm>
+          <a:prstGeom prst="rect">
+            <a:avLst/>
+          </a:prstGeom>
+          <a:noFill/>
+        </p:spPr>
+        <p:txBody>
+          <a:bodyPr wrap="none" rtlCol="0">
+            <a:spAutoFit/>
+          </a:bodyPr>
+          <a:lstStyle/>
+          <a:p>
+            <a:r>
+              <a:rPr lang="en-US" dirty="0"/>
+              <a:t>Mental health tweets, November 30th, 2020</a:t>
+            </a:r>
+          </a:p>
+        </p:txBody>
+      </p:sp>
+    </p:spTree>
+    <p:extLst>
+      <p:ext uri="{BB962C8B-B14F-4D97-AF65-F5344CB8AC3E}">
+        <p14:creationId xmlns:p14="http://schemas.microsoft.com/office/powerpoint/2010/main" val="1744888121"/>
+      </p:ext>
+    </p:extLst>
+  </p:cSld>
+  <p:clrMapOvr>
+    <a:masterClrMapping/>
+  </p:clrMapOvr>
+</p:sld>
+</file>
+
+<file path=ppt/slides/slide8.xml><?xml version="1.0" encoding="utf-8"?>
+<p:sld xmlns:a="http://schemas.openxmlformats.org/drawingml/2006/main" xmlns:r="http://schemas.openxmlformats.org/officeDocument/2006/relationships" xmlns:p="http://schemas.openxmlformats.org/presentationml/2006/main">
+  <p:cSld>
+    <p:spTree>
+      <p:nvGrpSpPr>
+        <p:cNvPr id="1" name=""/>
+        <p:cNvGrpSpPr/>
+        <p:nvPr/>
+      </p:nvGrpSpPr>
+      <p:grpSpPr>
+        <a:xfrm>
+          <a:off x="0" y="0"/>
+          <a:ext cx="0" cy="0"/>
+          <a:chOff x="0" y="0"/>
+          <a:chExt cx="0" cy="0"/>
+        </a:xfrm>
+      </p:grpSpPr>
+      <p:sp>
+        <p:nvSpPr>
+          <p:cNvPr id="2" name="Title 1">
+            <a:extLst>
+              <a:ext uri="{FF2B5EF4-FFF2-40B4-BE49-F238E27FC236}">
+                <a16:creationId xmlns:a16="http://schemas.microsoft.com/office/drawing/2014/main" id="{2A8677ED-D002-A048-BF00-00A322030F7C}"/>
+              </a:ext>
+            </a:extLst>
+          </p:cNvPr>
+          <p:cNvSpPr>
+            <a:spLocks noGrp="1"/>
+          </p:cNvSpPr>
+          <p:nvPr>
+            <p:ph type="title"/>
+          </p:nvPr>
+        </p:nvSpPr>
+        <p:spPr/>
+        <p:txBody>
+          <a:bodyPr/>
+          <a:lstStyle/>
+          <a:p>
+            <a:endParaRPr lang="en-US"/>
+          </a:p>
+        </p:txBody>
+      </p:sp>
+      <p:sp>
+        <p:nvSpPr>
+          <p:cNvPr id="3" name="Content Placeholder 2">
+            <a:extLst>
+              <a:ext uri="{FF2B5EF4-FFF2-40B4-BE49-F238E27FC236}">
+                <a16:creationId xmlns:a16="http://schemas.microsoft.com/office/drawing/2014/main" id="{6BC4F753-96E1-624C-96D1-76E13E034C92}"/>
+              </a:ext>
+            </a:extLst>
+          </p:cNvPr>
+          <p:cNvSpPr>
+            <a:spLocks noGrp="1"/>
+          </p:cNvSpPr>
+          <p:nvPr>
+            <p:ph idx="1"/>
+          </p:nvPr>
+        </p:nvSpPr>
+        <p:spPr/>
+        <p:txBody>
+          <a:bodyPr/>
+          <a:lstStyle/>
+          <a:p>
+            <a:endParaRPr lang="en-US"/>
+          </a:p>
+        </p:txBody>
+      </p:sp>
+    </p:spTree>
+    <p:extLst>
+      <p:ext uri="{BB962C8B-B14F-4D97-AF65-F5344CB8AC3E}">
+        <p14:creationId xmlns:p14="http://schemas.microsoft.com/office/powerpoint/2010/main" val="2421079471"/>
       </p:ext>
     </p:extLst>
   </p:cSld>

</xml_diff>